<commit_message>
pertemuan 17 struktur data
</commit_message>
<xml_diff>
--- a/semester 3/Graph Terapan/GRAPH TERAPAN - Kelompok 8 - Modul 8.pptx
+++ b/semester 3/Graph Terapan/GRAPH TERAPAN - Kelompok 8 - Modul 8.pptx
@@ -5,36 +5,37 @@
     <p:sldMasterId id="2147483670" r:id="rId1"/>
   </p:sldMasterIdLst>
   <p:notesMasterIdLst>
-    <p:notesMasterId r:id="rId12"/>
+    <p:notesMasterId r:id="rId13"/>
   </p:notesMasterIdLst>
   <p:sldIdLst>
     <p:sldId id="256" r:id="rId2"/>
     <p:sldId id="262" r:id="rId3"/>
-    <p:sldId id="373" r:id="rId4"/>
-    <p:sldId id="374" r:id="rId5"/>
-    <p:sldId id="375" r:id="rId6"/>
-    <p:sldId id="376" r:id="rId7"/>
-    <p:sldId id="377" r:id="rId8"/>
-    <p:sldId id="378" r:id="rId9"/>
-    <p:sldId id="379" r:id="rId10"/>
-    <p:sldId id="315" r:id="rId11"/>
+    <p:sldId id="380" r:id="rId4"/>
+    <p:sldId id="373" r:id="rId5"/>
+    <p:sldId id="374" r:id="rId6"/>
+    <p:sldId id="375" r:id="rId7"/>
+    <p:sldId id="376" r:id="rId8"/>
+    <p:sldId id="377" r:id="rId9"/>
+    <p:sldId id="378" r:id="rId10"/>
+    <p:sldId id="379" r:id="rId11"/>
+    <p:sldId id="315" r:id="rId12"/>
   </p:sldIdLst>
   <p:sldSz cx="9144000" cy="5143500" type="screen16x9"/>
   <p:notesSz cx="6858000" cy="9144000"/>
   <p:embeddedFontLst>
     <p:embeddedFont>
       <p:font typeface="Arvo" panose="020B0604020202020204" charset="0"/>
-      <p:regular r:id="rId13"/>
-      <p:bold r:id="rId14"/>
-      <p:italic r:id="rId15"/>
-      <p:boldItalic r:id="rId16"/>
+      <p:regular r:id="rId14"/>
+      <p:bold r:id="rId15"/>
+      <p:italic r:id="rId16"/>
+      <p:boldItalic r:id="rId17"/>
     </p:embeddedFont>
     <p:embeddedFont>
       <p:font typeface="Barlow Condensed SemiBold" panose="00000706000000000000" pitchFamily="2" charset="0"/>
-      <p:regular r:id="rId17"/>
-      <p:bold r:id="rId18"/>
-      <p:italic r:id="rId19"/>
-      <p:boldItalic r:id="rId20"/>
+      <p:regular r:id="rId18"/>
+      <p:bold r:id="rId19"/>
+      <p:italic r:id="rId20"/>
+      <p:boldItalic r:id="rId21"/>
     </p:embeddedFont>
   </p:embeddedFontLst>
   <p:defaultTextStyle>
@@ -824,6 +825,115 @@
   <p:cSld>
     <p:spTree>
       <p:nvGrpSpPr>
+        <p:cNvPr id="1" name="Shape 921"/>
+        <p:cNvGrpSpPr/>
+        <p:nvPr/>
+      </p:nvGrpSpPr>
+      <p:grpSpPr>
+        <a:xfrm>
+          <a:off x="0" y="0"/>
+          <a:ext cx="0" cy="0"/>
+          <a:chOff x="0" y="0"/>
+          <a:chExt cx="0" cy="0"/>
+        </a:xfrm>
+      </p:grpSpPr>
+      <p:sp>
+        <p:nvSpPr>
+          <p:cNvPr id="922" name="Google Shape;922;g9c487f8d59_0_257:notes"/>
+          <p:cNvSpPr>
+            <a:spLocks noGrp="1" noRot="1" noChangeAspect="1"/>
+          </p:cNvSpPr>
+          <p:nvPr>
+            <p:ph type="sldImg" idx="2"/>
+          </p:nvPr>
+        </p:nvSpPr>
+        <p:spPr>
+          <a:xfrm>
+            <a:off x="381000" y="685800"/>
+            <a:ext cx="6096000" cy="3429000"/>
+          </a:xfrm>
+          <a:custGeom>
+            <a:avLst/>
+            <a:gdLst/>
+            <a:ahLst/>
+            <a:cxnLst/>
+            <a:rect l="l" t="t" r="r" b="b"/>
+            <a:pathLst>
+              <a:path w="120000" h="120000" extrusionOk="0">
+                <a:moveTo>
+                  <a:pt x="0" y="0"/>
+                </a:moveTo>
+                <a:lnTo>
+                  <a:pt x="120000" y="0"/>
+                </a:lnTo>
+                <a:lnTo>
+                  <a:pt x="120000" y="120000"/>
+                </a:lnTo>
+                <a:lnTo>
+                  <a:pt x="0" y="120000"/>
+                </a:lnTo>
+                <a:close/>
+              </a:path>
+            </a:pathLst>
+          </a:custGeom>
+        </p:spPr>
+      </p:sp>
+      <p:sp>
+        <p:nvSpPr>
+          <p:cNvPr id="923" name="Google Shape;923;g9c487f8d59_0_257:notes"/>
+          <p:cNvSpPr txBox="1">
+            <a:spLocks noGrp="1"/>
+          </p:cNvSpPr>
+          <p:nvPr>
+            <p:ph type="body" idx="1"/>
+          </p:nvPr>
+        </p:nvSpPr>
+        <p:spPr>
+          <a:xfrm>
+            <a:off x="685800" y="4343400"/>
+            <a:ext cx="5486400" cy="4114800"/>
+          </a:xfrm>
+          <a:prstGeom prst="rect">
+            <a:avLst/>
+          </a:prstGeom>
+        </p:spPr>
+        <p:txBody>
+          <a:bodyPr spcFirstLastPara="1" wrap="square" lIns="91425" tIns="91425" rIns="91425" bIns="91425" anchor="t" anchorCtr="0">
+            <a:noAutofit/>
+          </a:bodyPr>
+          <a:lstStyle/>
+          <a:p>
+            <a:pPr marL="0" lvl="0" indent="0" algn="l" rtl="0">
+              <a:spcBef>
+                <a:spcPts val="0"/>
+              </a:spcBef>
+              <a:spcAft>
+                <a:spcPts val="0"/>
+              </a:spcAft>
+              <a:buNone/>
+            </a:pPr>
+            <a:endParaRPr/>
+          </a:p>
+        </p:txBody>
+      </p:sp>
+    </p:spTree>
+    <p:extLst>
+      <p:ext uri="{BB962C8B-B14F-4D97-AF65-F5344CB8AC3E}">
+        <p14:creationId xmlns:p14="http://schemas.microsoft.com/office/powerpoint/2010/main" val="27790781"/>
+      </p:ext>
+    </p:extLst>
+  </p:cSld>
+  <p:clrMapOvr>
+    <a:masterClrMapping/>
+  </p:clrMapOvr>
+</p:notes>
+</file>
+
+<file path=ppt/notesSlides/notesSlide11.xml><?xml version="1.0" encoding="utf-8"?>
+<p:notes xmlns:a="http://schemas.openxmlformats.org/drawingml/2006/main" xmlns:r="http://schemas.openxmlformats.org/officeDocument/2006/relationships" xmlns:p="http://schemas.openxmlformats.org/presentationml/2006/main" showMasterSp="0" showMasterPhAnim="0">
+  <p:cSld>
+    <p:spTree>
+      <p:nvGrpSpPr>
         <p:cNvPr id="1" name="Shape 1567"/>
         <p:cNvGrpSpPr/>
         <p:nvPr/>
@@ -1126,7 +1236,7 @@
     </p:spTree>
     <p:extLst>
       <p:ext uri="{BB962C8B-B14F-4D97-AF65-F5344CB8AC3E}">
-        <p14:creationId xmlns:p14="http://schemas.microsoft.com/office/powerpoint/2010/main" val="4086259197"/>
+        <p14:creationId xmlns:p14="http://schemas.microsoft.com/office/powerpoint/2010/main" val="1488054684"/>
       </p:ext>
     </p:extLst>
   </p:cSld>
@@ -1235,7 +1345,7 @@
     </p:spTree>
     <p:extLst>
       <p:ext uri="{BB962C8B-B14F-4D97-AF65-F5344CB8AC3E}">
-        <p14:creationId xmlns:p14="http://schemas.microsoft.com/office/powerpoint/2010/main" val="3364223664"/>
+        <p14:creationId xmlns:p14="http://schemas.microsoft.com/office/powerpoint/2010/main" val="4086259197"/>
       </p:ext>
     </p:extLst>
   </p:cSld>
@@ -1344,7 +1454,7 @@
     </p:spTree>
     <p:extLst>
       <p:ext uri="{BB962C8B-B14F-4D97-AF65-F5344CB8AC3E}">
-        <p14:creationId xmlns:p14="http://schemas.microsoft.com/office/powerpoint/2010/main" val="1312375383"/>
+        <p14:creationId xmlns:p14="http://schemas.microsoft.com/office/powerpoint/2010/main" val="3364223664"/>
       </p:ext>
     </p:extLst>
   </p:cSld>
@@ -1453,7 +1563,7 @@
     </p:spTree>
     <p:extLst>
       <p:ext uri="{BB962C8B-B14F-4D97-AF65-F5344CB8AC3E}">
-        <p14:creationId xmlns:p14="http://schemas.microsoft.com/office/powerpoint/2010/main" val="2163146606"/>
+        <p14:creationId xmlns:p14="http://schemas.microsoft.com/office/powerpoint/2010/main" val="1312375383"/>
       </p:ext>
     </p:extLst>
   </p:cSld>
@@ -1562,7 +1672,7 @@
     </p:spTree>
     <p:extLst>
       <p:ext uri="{BB962C8B-B14F-4D97-AF65-F5344CB8AC3E}">
-        <p14:creationId xmlns:p14="http://schemas.microsoft.com/office/powerpoint/2010/main" val="495599163"/>
+        <p14:creationId xmlns:p14="http://schemas.microsoft.com/office/powerpoint/2010/main" val="2163146606"/>
       </p:ext>
     </p:extLst>
   </p:cSld>
@@ -1671,7 +1781,7 @@
     </p:spTree>
     <p:extLst>
       <p:ext uri="{BB962C8B-B14F-4D97-AF65-F5344CB8AC3E}">
-        <p14:creationId xmlns:p14="http://schemas.microsoft.com/office/powerpoint/2010/main" val="3637026633"/>
+        <p14:creationId xmlns:p14="http://schemas.microsoft.com/office/powerpoint/2010/main" val="495599163"/>
       </p:ext>
     </p:extLst>
   </p:cSld>
@@ -1780,7 +1890,7 @@
     </p:spTree>
     <p:extLst>
       <p:ext uri="{BB962C8B-B14F-4D97-AF65-F5344CB8AC3E}">
-        <p14:creationId xmlns:p14="http://schemas.microsoft.com/office/powerpoint/2010/main" val="27790781"/>
+        <p14:creationId xmlns:p14="http://schemas.microsoft.com/office/powerpoint/2010/main" val="3637026633"/>
       </p:ext>
     </p:extLst>
   </p:cSld>
@@ -12922,7 +13032,7 @@
                 <a:latin typeface="Arvo" panose="020B0604020202020204" charset="0"/>
                 <a:cs typeface="Arial" panose="020B0604020202020204" pitchFamily="34" charset="0"/>
               </a:rPr>
-              <a:t>KELOMPOK 8 – 03TPLP016 – MODUL 1:</a:t>
+              <a:t>KELOMPOK 8 – 03TPLP016 – MODUL 8:</a:t>
             </a:r>
           </a:p>
           <a:p>
@@ -15583,6 +15693,519 @@
 </file>
 
 <file path=ppt/slides/slide10.xml><?xml version="1.0" encoding="utf-8"?>
+<p:sld xmlns:a="http://schemas.openxmlformats.org/drawingml/2006/main" xmlns:r="http://schemas.openxmlformats.org/officeDocument/2006/relationships" xmlns:p="http://schemas.openxmlformats.org/presentationml/2006/main">
+  <p:cSld>
+    <p:spTree>
+      <p:nvGrpSpPr>
+        <p:cNvPr id="1" name="Shape 924"/>
+        <p:cNvGrpSpPr/>
+        <p:nvPr/>
+      </p:nvGrpSpPr>
+      <p:grpSpPr>
+        <a:xfrm>
+          <a:off x="0" y="0"/>
+          <a:ext cx="0" cy="0"/>
+          <a:chOff x="0" y="0"/>
+          <a:chExt cx="0" cy="0"/>
+        </a:xfrm>
+      </p:grpSpPr>
+      <p:sp>
+        <p:nvSpPr>
+          <p:cNvPr id="11" name="Google Shape;926;p32">
+            <a:extLst>
+              <a:ext uri="{FF2B5EF4-FFF2-40B4-BE49-F238E27FC236}">
+                <a16:creationId xmlns:a16="http://schemas.microsoft.com/office/drawing/2014/main" id="{647BC891-3EFB-43CC-85D4-222F6095862A}"/>
+              </a:ext>
+            </a:extLst>
+          </p:cNvPr>
+          <p:cNvSpPr txBox="1">
+            <a:spLocks noGrp="1"/>
+          </p:cNvSpPr>
+          <p:nvPr>
+            <p:ph type="subTitle" idx="1"/>
+          </p:nvPr>
+        </p:nvSpPr>
+        <p:spPr>
+          <a:xfrm>
+            <a:off x="348456" y="1162050"/>
+            <a:ext cx="8447088" cy="1572408"/>
+          </a:xfrm>
+          <a:prstGeom prst="rect">
+            <a:avLst/>
+          </a:prstGeom>
+        </p:spPr>
+        <p:txBody>
+          <a:bodyPr spcFirstLastPara="1" wrap="square" lIns="91425" tIns="91425" rIns="91425" bIns="91425" anchor="t" anchorCtr="0">
+            <a:noAutofit/>
+          </a:bodyPr>
+          <a:lstStyle/>
+          <a:p>
+            <a:pPr marL="0" lvl="0" indent="0" algn="just" rtl="0">
+              <a:lnSpc>
+                <a:spcPct val="150000"/>
+              </a:lnSpc>
+              <a:spcBef>
+                <a:spcPts val="0"/>
+              </a:spcBef>
+              <a:spcAft>
+                <a:spcPts val="0"/>
+              </a:spcAft>
+            </a:pPr>
+            <a:r>
+              <a:rPr lang="en-US" sz="2000" dirty="0"/>
+              <a:t>Graf </a:t>
+            </a:r>
+            <a:r>
+              <a:rPr lang="en-US" sz="2000" dirty="0" err="1"/>
+              <a:t>dapat</a:t>
+            </a:r>
+            <a:r>
+              <a:rPr lang="en-US" sz="2000" dirty="0"/>
+              <a:t> </a:t>
+            </a:r>
+            <a:r>
+              <a:rPr lang="en-US" sz="2000" dirty="0" err="1"/>
+              <a:t>tidak</a:t>
+            </a:r>
+            <a:r>
+              <a:rPr lang="en-US" sz="2000" dirty="0"/>
+              <a:t> </a:t>
+            </a:r>
+            <a:r>
+              <a:rPr lang="en-US" sz="2000" dirty="0" err="1"/>
+              <a:t>mengandung</a:t>
+            </a:r>
+            <a:r>
+              <a:rPr lang="en-US" sz="2000" dirty="0"/>
+              <a:t>:</a:t>
+            </a:r>
+          </a:p>
+          <a:p>
+            <a:pPr marL="342900" lvl="0" indent="-342900" algn="just" rtl="0">
+              <a:lnSpc>
+                <a:spcPct val="150000"/>
+              </a:lnSpc>
+              <a:spcBef>
+                <a:spcPts val="0"/>
+              </a:spcBef>
+              <a:spcAft>
+                <a:spcPts val="0"/>
+              </a:spcAft>
+              <a:buFont typeface="Wingdings" panose="05000000000000000000" pitchFamily="2" charset="2"/>
+              <a:buChar char="q"/>
+            </a:pPr>
+            <a:r>
+              <a:rPr lang="en-US" sz="2000" dirty="0" err="1"/>
+              <a:t>Lintasan</a:t>
+            </a:r>
+            <a:r>
+              <a:rPr lang="en-US" sz="2000" dirty="0"/>
+              <a:t> Euler </a:t>
+            </a:r>
+            <a:r>
+              <a:rPr lang="en-US" sz="2000" dirty="0" err="1"/>
+              <a:t>namun</a:t>
+            </a:r>
+            <a:r>
+              <a:rPr lang="en-US" sz="2000" dirty="0"/>
+              <a:t> </a:t>
+            </a:r>
+            <a:r>
+              <a:rPr lang="en-US" sz="2000" dirty="0" err="1"/>
+              <a:t>mengandung</a:t>
+            </a:r>
+            <a:r>
+              <a:rPr lang="en-US" sz="2000" dirty="0"/>
+              <a:t> </a:t>
+            </a:r>
+            <a:r>
+              <a:rPr lang="en-US" sz="2000" dirty="0" err="1"/>
+              <a:t>sirkuit</a:t>
+            </a:r>
+            <a:r>
+              <a:rPr lang="en-US" sz="2000" dirty="0"/>
+              <a:t> Hamilton.</a:t>
+            </a:r>
+          </a:p>
+          <a:p>
+            <a:pPr marL="342900" lvl="0" indent="-342900" algn="just" rtl="0">
+              <a:lnSpc>
+                <a:spcPct val="150000"/>
+              </a:lnSpc>
+              <a:spcBef>
+                <a:spcPts val="0"/>
+              </a:spcBef>
+              <a:spcAft>
+                <a:spcPts val="0"/>
+              </a:spcAft>
+              <a:buFont typeface="Wingdings" panose="05000000000000000000" pitchFamily="2" charset="2"/>
+              <a:buChar char="q"/>
+            </a:pPr>
+            <a:r>
+              <a:rPr lang="en-US" sz="2000" dirty="0"/>
+              <a:t>Dan lain </a:t>
+            </a:r>
+            <a:r>
+              <a:rPr lang="en-US" sz="2000" dirty="0" err="1"/>
+              <a:t>sebagainya</a:t>
+            </a:r>
+            <a:r>
+              <a:rPr lang="en-US" sz="2000" dirty="0"/>
+              <a:t>.</a:t>
+            </a:r>
+          </a:p>
+        </p:txBody>
+      </p:sp>
+      <p:pic>
+        <p:nvPicPr>
+          <p:cNvPr id="7" name="Picture 6">
+            <a:extLst>
+              <a:ext uri="{FF2B5EF4-FFF2-40B4-BE49-F238E27FC236}">
+                <a16:creationId xmlns:a16="http://schemas.microsoft.com/office/drawing/2014/main" id="{0BDEEEB3-82BD-4D2F-A9C4-27E0F93B3691}"/>
+              </a:ext>
+            </a:extLst>
+          </p:cNvPr>
+          <p:cNvPicPr>
+            <a:picLocks noChangeAspect="1"/>
+          </p:cNvPicPr>
+          <p:nvPr/>
+        </p:nvPicPr>
+        <p:blipFill>
+          <a:blip r:embed="rId3"/>
+          <a:stretch>
+            <a:fillRect/>
+          </a:stretch>
+        </p:blipFill>
+        <p:spPr>
+          <a:xfrm>
+            <a:off x="427962" y="2809762"/>
+            <a:ext cx="2171177" cy="1880573"/>
+          </a:xfrm>
+          <a:prstGeom prst="rect">
+            <a:avLst/>
+          </a:prstGeom>
+        </p:spPr>
+      </p:pic>
+      <p:sp>
+        <p:nvSpPr>
+          <p:cNvPr id="12" name="Google Shape;926;p32">
+            <a:extLst>
+              <a:ext uri="{FF2B5EF4-FFF2-40B4-BE49-F238E27FC236}">
+                <a16:creationId xmlns:a16="http://schemas.microsoft.com/office/drawing/2014/main" id="{E53B5AC5-ABD1-4CD5-B057-4A093C523306}"/>
+              </a:ext>
+            </a:extLst>
+          </p:cNvPr>
+          <p:cNvSpPr txBox="1">
+            <a:spLocks/>
+          </p:cNvSpPr>
+          <p:nvPr/>
+        </p:nvSpPr>
+        <p:spPr>
+          <a:xfrm>
+            <a:off x="2599139" y="3076687"/>
+            <a:ext cx="6196405" cy="904763"/>
+          </a:xfrm>
+          <a:prstGeom prst="rect">
+            <a:avLst/>
+          </a:prstGeom>
+          <a:noFill/>
+          <a:ln>
+            <a:noFill/>
+          </a:ln>
+        </p:spPr>
+        <p:txBody>
+          <a:bodyPr spcFirstLastPara="1" wrap="square" lIns="91425" tIns="91425" rIns="91425" bIns="91425" anchor="t" anchorCtr="0">
+            <a:noAutofit/>
+          </a:bodyPr>
+          <a:lstStyle>
+            <a:defPPr marR="0" lvl="0" algn="l" rtl="0">
+              <a:lnSpc>
+                <a:spcPct val="100000"/>
+              </a:lnSpc>
+              <a:spcBef>
+                <a:spcPts val="0"/>
+              </a:spcBef>
+              <a:spcAft>
+                <a:spcPts val="0"/>
+              </a:spcAft>
+            </a:defPPr>
+            <a:lvl1pPr marL="457200" marR="0" lvl="0" indent="-317500" algn="l" rtl="0">
+              <a:lnSpc>
+                <a:spcPct val="100000"/>
+              </a:lnSpc>
+              <a:spcBef>
+                <a:spcPts val="0"/>
+              </a:spcBef>
+              <a:spcAft>
+                <a:spcPts val="0"/>
+              </a:spcAft>
+              <a:buClr>
+                <a:schemeClr val="dk2"/>
+              </a:buClr>
+              <a:buSzPts val="1400"/>
+              <a:buFont typeface="Arvo"/>
+              <a:buNone/>
+              <a:defRPr sz="1400" b="0" i="0" u="none" strike="noStrike" cap="none">
+                <a:solidFill>
+                  <a:schemeClr val="dk2"/>
+                </a:solidFill>
+                <a:latin typeface="Arvo"/>
+                <a:ea typeface="Arvo"/>
+                <a:cs typeface="Arvo"/>
+                <a:sym typeface="Arvo"/>
+              </a:defRPr>
+            </a:lvl1pPr>
+            <a:lvl2pPr marL="914400" marR="0" lvl="1" indent="-317500" algn="l" rtl="0">
+              <a:lnSpc>
+                <a:spcPct val="100000"/>
+              </a:lnSpc>
+              <a:spcBef>
+                <a:spcPts val="1600"/>
+              </a:spcBef>
+              <a:spcAft>
+                <a:spcPts val="0"/>
+              </a:spcAft>
+              <a:buClr>
+                <a:schemeClr val="dk2"/>
+              </a:buClr>
+              <a:buSzPts val="1400"/>
+              <a:buFont typeface="Arvo"/>
+              <a:buNone/>
+              <a:defRPr sz="1400" b="0" i="0" u="none" strike="noStrike" cap="none">
+                <a:solidFill>
+                  <a:schemeClr val="dk2"/>
+                </a:solidFill>
+                <a:latin typeface="Arvo"/>
+                <a:ea typeface="Arvo"/>
+                <a:cs typeface="Arvo"/>
+                <a:sym typeface="Arvo"/>
+              </a:defRPr>
+            </a:lvl2pPr>
+            <a:lvl3pPr marL="1371600" marR="0" lvl="2" indent="-317500" algn="l" rtl="0">
+              <a:lnSpc>
+                <a:spcPct val="100000"/>
+              </a:lnSpc>
+              <a:spcBef>
+                <a:spcPts val="1600"/>
+              </a:spcBef>
+              <a:spcAft>
+                <a:spcPts val="0"/>
+              </a:spcAft>
+              <a:buClr>
+                <a:schemeClr val="dk2"/>
+              </a:buClr>
+              <a:buSzPts val="1400"/>
+              <a:buFont typeface="Arvo"/>
+              <a:buNone/>
+              <a:defRPr sz="1400" b="0" i="0" u="none" strike="noStrike" cap="none">
+                <a:solidFill>
+                  <a:schemeClr val="dk2"/>
+                </a:solidFill>
+                <a:latin typeface="Arvo"/>
+                <a:ea typeface="Arvo"/>
+                <a:cs typeface="Arvo"/>
+                <a:sym typeface="Arvo"/>
+              </a:defRPr>
+            </a:lvl3pPr>
+            <a:lvl4pPr marL="1828800" marR="0" lvl="3" indent="-317500" algn="l" rtl="0">
+              <a:lnSpc>
+                <a:spcPct val="100000"/>
+              </a:lnSpc>
+              <a:spcBef>
+                <a:spcPts val="1600"/>
+              </a:spcBef>
+              <a:spcAft>
+                <a:spcPts val="0"/>
+              </a:spcAft>
+              <a:buClr>
+                <a:schemeClr val="dk2"/>
+              </a:buClr>
+              <a:buSzPts val="1400"/>
+              <a:buFont typeface="Arvo"/>
+              <a:buNone/>
+              <a:defRPr sz="1400" b="0" i="0" u="none" strike="noStrike" cap="none">
+                <a:solidFill>
+                  <a:schemeClr val="dk2"/>
+                </a:solidFill>
+                <a:latin typeface="Arvo"/>
+                <a:ea typeface="Arvo"/>
+                <a:cs typeface="Arvo"/>
+                <a:sym typeface="Arvo"/>
+              </a:defRPr>
+            </a:lvl4pPr>
+            <a:lvl5pPr marL="2286000" marR="0" lvl="4" indent="-317500" algn="l" rtl="0">
+              <a:lnSpc>
+                <a:spcPct val="100000"/>
+              </a:lnSpc>
+              <a:spcBef>
+                <a:spcPts val="1600"/>
+              </a:spcBef>
+              <a:spcAft>
+                <a:spcPts val="0"/>
+              </a:spcAft>
+              <a:buClr>
+                <a:schemeClr val="dk2"/>
+              </a:buClr>
+              <a:buSzPts val="1400"/>
+              <a:buFont typeface="Arvo"/>
+              <a:buNone/>
+              <a:defRPr sz="1400" b="0" i="0" u="none" strike="noStrike" cap="none">
+                <a:solidFill>
+                  <a:schemeClr val="dk2"/>
+                </a:solidFill>
+                <a:latin typeface="Arvo"/>
+                <a:ea typeface="Arvo"/>
+                <a:cs typeface="Arvo"/>
+                <a:sym typeface="Arvo"/>
+              </a:defRPr>
+            </a:lvl5pPr>
+            <a:lvl6pPr marL="2743200" marR="0" lvl="5" indent="-317500" algn="l" rtl="0">
+              <a:lnSpc>
+                <a:spcPct val="100000"/>
+              </a:lnSpc>
+              <a:spcBef>
+                <a:spcPts val="1600"/>
+              </a:spcBef>
+              <a:spcAft>
+                <a:spcPts val="0"/>
+              </a:spcAft>
+              <a:buClr>
+                <a:schemeClr val="dk2"/>
+              </a:buClr>
+              <a:buSzPts val="1400"/>
+              <a:buFont typeface="Arvo"/>
+              <a:buNone/>
+              <a:defRPr sz="1400" b="0" i="0" u="none" strike="noStrike" cap="none">
+                <a:solidFill>
+                  <a:schemeClr val="dk2"/>
+                </a:solidFill>
+                <a:latin typeface="Arvo"/>
+                <a:ea typeface="Arvo"/>
+                <a:cs typeface="Arvo"/>
+                <a:sym typeface="Arvo"/>
+              </a:defRPr>
+            </a:lvl6pPr>
+            <a:lvl7pPr marL="3200400" marR="0" lvl="6" indent="-317500" algn="l" rtl="0">
+              <a:lnSpc>
+                <a:spcPct val="100000"/>
+              </a:lnSpc>
+              <a:spcBef>
+                <a:spcPts val="1600"/>
+              </a:spcBef>
+              <a:spcAft>
+                <a:spcPts val="0"/>
+              </a:spcAft>
+              <a:buClr>
+                <a:schemeClr val="dk2"/>
+              </a:buClr>
+              <a:buSzPts val="1400"/>
+              <a:buFont typeface="Arvo"/>
+              <a:buNone/>
+              <a:defRPr sz="1400" b="0" i="0" u="none" strike="noStrike" cap="none">
+                <a:solidFill>
+                  <a:schemeClr val="dk2"/>
+                </a:solidFill>
+                <a:latin typeface="Arvo"/>
+                <a:ea typeface="Arvo"/>
+                <a:cs typeface="Arvo"/>
+                <a:sym typeface="Arvo"/>
+              </a:defRPr>
+            </a:lvl7pPr>
+            <a:lvl8pPr marL="3657600" marR="0" lvl="7" indent="-317500" algn="l" rtl="0">
+              <a:lnSpc>
+                <a:spcPct val="100000"/>
+              </a:lnSpc>
+              <a:spcBef>
+                <a:spcPts val="1600"/>
+              </a:spcBef>
+              <a:spcAft>
+                <a:spcPts val="0"/>
+              </a:spcAft>
+              <a:buClr>
+                <a:schemeClr val="dk2"/>
+              </a:buClr>
+              <a:buSzPts val="1400"/>
+              <a:buFont typeface="Arvo"/>
+              <a:buNone/>
+              <a:defRPr sz="1400" b="0" i="0" u="none" strike="noStrike" cap="none">
+                <a:solidFill>
+                  <a:schemeClr val="dk2"/>
+                </a:solidFill>
+                <a:latin typeface="Arvo"/>
+                <a:ea typeface="Arvo"/>
+                <a:cs typeface="Arvo"/>
+                <a:sym typeface="Arvo"/>
+              </a:defRPr>
+            </a:lvl8pPr>
+            <a:lvl9pPr marL="4114800" marR="0" lvl="8" indent="-317500" algn="l" rtl="0">
+              <a:lnSpc>
+                <a:spcPct val="100000"/>
+              </a:lnSpc>
+              <a:spcBef>
+                <a:spcPts val="1600"/>
+              </a:spcBef>
+              <a:spcAft>
+                <a:spcPts val="1600"/>
+              </a:spcAft>
+              <a:buClr>
+                <a:schemeClr val="dk2"/>
+              </a:buClr>
+              <a:buSzPts val="1400"/>
+              <a:buFont typeface="Arvo"/>
+              <a:buNone/>
+              <a:defRPr sz="1400" b="0" i="0" u="none" strike="noStrike" cap="none">
+                <a:solidFill>
+                  <a:schemeClr val="dk2"/>
+                </a:solidFill>
+                <a:latin typeface="Arvo"/>
+                <a:ea typeface="Arvo"/>
+                <a:cs typeface="Arvo"/>
+                <a:sym typeface="Arvo"/>
+              </a:defRPr>
+            </a:lvl9pPr>
+          </a:lstStyle>
+          <a:p>
+            <a:pPr marL="0" indent="0" algn="just">
+              <a:lnSpc>
+                <a:spcPct val="150000"/>
+              </a:lnSpc>
+            </a:pPr>
+            <a:r>
+              <a:rPr lang="da-DK" sz="2000" dirty="0"/>
+              <a:t>(a) Graf Hamilton sekaligus graf Euler.</a:t>
+            </a:r>
+          </a:p>
+          <a:p>
+            <a:pPr marL="0" indent="0" algn="just">
+              <a:lnSpc>
+                <a:spcPct val="150000"/>
+              </a:lnSpc>
+            </a:pPr>
+            <a:r>
+              <a:rPr lang="da-DK" sz="2000" dirty="0"/>
+              <a:t>(b) Graf Hamilton sekaligus graf semi-Euler.</a:t>
+            </a:r>
+            <a:endParaRPr lang="en-US" sz="2000" dirty="0"/>
+          </a:p>
+        </p:txBody>
+      </p:sp>
+    </p:spTree>
+    <p:extLst>
+      <p:ext uri="{BB962C8B-B14F-4D97-AF65-F5344CB8AC3E}">
+        <p14:creationId xmlns:p14="http://schemas.microsoft.com/office/powerpoint/2010/main" val="405687146"/>
+      </p:ext>
+    </p:extLst>
+  </p:cSld>
+  <p:clrMapOvr>
+    <a:masterClrMapping/>
+  </p:clrMapOvr>
+  <p:transition spd="med">
+    <p:pull/>
+  </p:transition>
+</p:sld>
+</file>
+
+<file path=ppt/slides/slide11.xml><?xml version="1.0" encoding="utf-8"?>
 <p:sld xmlns:a="http://schemas.openxmlformats.org/drawingml/2006/main" xmlns:r="http://schemas.openxmlformats.org/officeDocument/2006/relationships" xmlns:p="http://schemas.openxmlformats.org/presentationml/2006/main">
   <p:cSld>
     <p:spTree>
@@ -16357,7 +16980,7 @@
     </p:spTree>
     <p:extLst>
       <p:ext uri="{BB962C8B-B14F-4D97-AF65-F5344CB8AC3E}">
-        <p14:creationId xmlns:p14="http://schemas.microsoft.com/office/powerpoint/2010/main" val="654200036"/>
+        <p14:creationId xmlns:p14="http://schemas.microsoft.com/office/powerpoint/2010/main" val="1004033053"/>
       </p:ext>
     </p:extLst>
   </p:cSld>
@@ -16423,6 +17046,138 @@
             </a:pPr>
             <a:r>
               <a:rPr lang="en-ID" dirty="0"/>
+              <a:t>CONTOH GRAF HAMILTON</a:t>
+            </a:r>
+          </a:p>
+        </p:txBody>
+      </p:sp>
+      <p:cxnSp>
+        <p:nvCxnSpPr>
+          <p:cNvPr id="927" name="Google Shape;927;p32"/>
+          <p:cNvCxnSpPr>
+            <a:cxnSpLocks/>
+          </p:cNvCxnSpPr>
+          <p:nvPr/>
+        </p:nvCxnSpPr>
+        <p:spPr>
+          <a:xfrm>
+            <a:off x="464073" y="2164088"/>
+            <a:ext cx="5205207" cy="0"/>
+          </a:xfrm>
+          <a:prstGeom prst="straightConnector1">
+            <a:avLst/>
+          </a:prstGeom>
+          <a:noFill/>
+          <a:ln w="28575" cap="flat" cmpd="sng">
+            <a:solidFill>
+              <a:schemeClr val="accent4"/>
+            </a:solidFill>
+            <a:prstDash val="solid"/>
+            <a:round/>
+            <a:headEnd type="none" w="med" len="med"/>
+            <a:tailEnd type="none" w="med" len="med"/>
+          </a:ln>
+        </p:spPr>
+      </p:cxnSp>
+      <p:pic>
+        <p:nvPicPr>
+          <p:cNvPr id="3" name="Picture 2">
+            <a:extLst>
+              <a:ext uri="{FF2B5EF4-FFF2-40B4-BE49-F238E27FC236}">
+                <a16:creationId xmlns:a16="http://schemas.microsoft.com/office/drawing/2014/main" id="{F99B03D0-D38C-4CB9-98B3-D959173A49E0}"/>
+              </a:ext>
+            </a:extLst>
+          </p:cNvPr>
+          <p:cNvPicPr>
+            <a:picLocks noChangeAspect="1"/>
+          </p:cNvPicPr>
+          <p:nvPr/>
+        </p:nvPicPr>
+        <p:blipFill>
+          <a:blip r:embed="rId3"/>
+          <a:stretch>
+            <a:fillRect/>
+          </a:stretch>
+        </p:blipFill>
+        <p:spPr>
+          <a:xfrm>
+            <a:off x="464072" y="2329188"/>
+            <a:ext cx="5209457" cy="2371904"/>
+          </a:xfrm>
+          <a:prstGeom prst="rect">
+            <a:avLst/>
+          </a:prstGeom>
+        </p:spPr>
+      </p:pic>
+    </p:spTree>
+    <p:extLst>
+      <p:ext uri="{BB962C8B-B14F-4D97-AF65-F5344CB8AC3E}">
+        <p14:creationId xmlns:p14="http://schemas.microsoft.com/office/powerpoint/2010/main" val="654200036"/>
+      </p:ext>
+    </p:extLst>
+  </p:cSld>
+  <p:clrMapOvr>
+    <a:masterClrMapping/>
+  </p:clrMapOvr>
+  <p:transition spd="med">
+    <p:pull/>
+  </p:transition>
+</p:sld>
+</file>
+
+<file path=ppt/slides/slide5.xml><?xml version="1.0" encoding="utf-8"?>
+<p:sld xmlns:a="http://schemas.openxmlformats.org/drawingml/2006/main" xmlns:r="http://schemas.openxmlformats.org/officeDocument/2006/relationships" xmlns:p="http://schemas.openxmlformats.org/presentationml/2006/main">
+  <p:cSld>
+    <p:spTree>
+      <p:nvGrpSpPr>
+        <p:cNvPr id="1" name="Shape 924"/>
+        <p:cNvGrpSpPr/>
+        <p:nvPr/>
+      </p:nvGrpSpPr>
+      <p:grpSpPr>
+        <a:xfrm>
+          <a:off x="0" y="0"/>
+          <a:ext cx="0" cy="0"/>
+          <a:chOff x="0" y="0"/>
+          <a:chExt cx="0" cy="0"/>
+        </a:xfrm>
+      </p:grpSpPr>
+      <p:sp>
+        <p:nvSpPr>
+          <p:cNvPr id="925" name="Google Shape;925;p32"/>
+          <p:cNvSpPr txBox="1">
+            <a:spLocks noGrp="1"/>
+          </p:cNvSpPr>
+          <p:nvPr>
+            <p:ph type="title"/>
+          </p:nvPr>
+        </p:nvSpPr>
+        <p:spPr>
+          <a:xfrm>
+            <a:off x="361950" y="1371898"/>
+            <a:ext cx="7372798" cy="882201"/>
+          </a:xfrm>
+          <a:prstGeom prst="rect">
+            <a:avLst/>
+          </a:prstGeom>
+        </p:spPr>
+        <p:txBody>
+          <a:bodyPr spcFirstLastPara="1" wrap="square" lIns="91425" tIns="91425" rIns="91425" bIns="91425" anchor="b" anchorCtr="0">
+            <a:noAutofit/>
+          </a:bodyPr>
+          <a:lstStyle/>
+          <a:p>
+            <a:pPr marL="0" lvl="0" indent="0" algn="l" rtl="0">
+              <a:spcBef>
+                <a:spcPts val="0"/>
+              </a:spcBef>
+              <a:spcAft>
+                <a:spcPts val="0"/>
+              </a:spcAft>
+              <a:buNone/>
+            </a:pPr>
+            <a:r>
+              <a:rPr lang="en-ID" dirty="0"/>
               <a:t>TEORAMA GRAF</a:t>
             </a:r>
           </a:p>
@@ -16480,39 +17235,7 @@
             </a:r>
             <a:r>
               <a:rPr lang="en-ID" sz="2000" dirty="0"/>
-              <a:t> (</a:t>
-            </a:r>
-            <a:r>
-              <a:rPr lang="en-ID" sz="2000" dirty="0" err="1"/>
-              <a:t>jadi</a:t>
-            </a:r>
-            <a:r>
-              <a:rPr lang="en-ID" sz="2000" dirty="0"/>
               <a:t> </a:t>
-            </a:r>
-            <a:r>
-              <a:rPr lang="en-ID" sz="2000" dirty="0" err="1"/>
-              <a:t>bukan</a:t>
-            </a:r>
-            <a:r>
-              <a:rPr lang="en-ID" sz="2000" dirty="0"/>
-              <a:t> </a:t>
-            </a:r>
-            <a:r>
-              <a:rPr lang="en-ID" sz="2000" dirty="0" err="1"/>
-              <a:t>syarat</a:t>
-            </a:r>
-            <a:r>
-              <a:rPr lang="en-ID" sz="2000" dirty="0"/>
-              <a:t> </a:t>
-            </a:r>
-            <a:r>
-              <a:rPr lang="en-ID" sz="2000" dirty="0" err="1"/>
-              <a:t>perlu</a:t>
-            </a:r>
-            <a:r>
-              <a:rPr lang="en-ID" sz="2000" dirty="0"/>
-              <a:t>) </a:t>
             </a:r>
             <a:r>
               <a:rPr lang="en-ID" sz="2000" dirty="0" err="1"/>
@@ -16740,7 +17463,7 @@
 </p:sld>
 </file>
 
-<file path=ppt/slides/slide5.xml><?xml version="1.0" encoding="utf-8"?>
+<file path=ppt/slides/slide6.xml><?xml version="1.0" encoding="utf-8"?>
 <p:sld xmlns:a="http://schemas.openxmlformats.org/drawingml/2006/main" xmlns:r="http://schemas.openxmlformats.org/officeDocument/2006/relationships" xmlns:p="http://schemas.openxmlformats.org/presentationml/2006/main">
   <p:cSld>
     <p:spTree>
@@ -17038,7 +17761,7 @@
 </p:sld>
 </file>
 
-<file path=ppt/slides/slide6.xml><?xml version="1.0" encoding="utf-8"?>
+<file path=ppt/slides/slide7.xml><?xml version="1.0" encoding="utf-8"?>
 <p:sld xmlns:a="http://schemas.openxmlformats.org/drawingml/2006/main" xmlns:r="http://schemas.openxmlformats.org/officeDocument/2006/relationships" xmlns:p="http://schemas.openxmlformats.org/presentationml/2006/main">
   <p:cSld>
     <p:spTree>
@@ -17448,7 +18171,7 @@
 </p:sld>
 </file>
 
-<file path=ppt/slides/slide7.xml><?xml version="1.0" encoding="utf-8"?>
+<file path=ppt/slides/slide8.xml><?xml version="1.0" encoding="utf-8"?>
 <p:sld xmlns:a="http://schemas.openxmlformats.org/drawingml/2006/main" xmlns:r="http://schemas.openxmlformats.org/officeDocument/2006/relationships" xmlns:p="http://schemas.openxmlformats.org/presentationml/2006/main">
   <p:cSld>
     <p:spTree>
@@ -17674,7 +18397,7 @@
 </p:sld>
 </file>
 
-<file path=ppt/slides/slide8.xml><?xml version="1.0" encoding="utf-8"?>
+<file path=ppt/slides/slide9.xml><?xml version="1.0" encoding="utf-8"?>
 <p:sld xmlns:a="http://schemas.openxmlformats.org/drawingml/2006/main" xmlns:r="http://schemas.openxmlformats.org/officeDocument/2006/relationships" xmlns:p="http://schemas.openxmlformats.org/presentationml/2006/main">
   <p:cSld>
     <p:spTree>
@@ -17962,519 +18685,6 @@
     <p:extLst>
       <p:ext uri="{BB962C8B-B14F-4D97-AF65-F5344CB8AC3E}">
         <p14:creationId xmlns:p14="http://schemas.microsoft.com/office/powerpoint/2010/main" val="2309324368"/>
-      </p:ext>
-    </p:extLst>
-  </p:cSld>
-  <p:clrMapOvr>
-    <a:masterClrMapping/>
-  </p:clrMapOvr>
-  <p:transition spd="med">
-    <p:pull/>
-  </p:transition>
-</p:sld>
-</file>
-
-<file path=ppt/slides/slide9.xml><?xml version="1.0" encoding="utf-8"?>
-<p:sld xmlns:a="http://schemas.openxmlformats.org/drawingml/2006/main" xmlns:r="http://schemas.openxmlformats.org/officeDocument/2006/relationships" xmlns:p="http://schemas.openxmlformats.org/presentationml/2006/main">
-  <p:cSld>
-    <p:spTree>
-      <p:nvGrpSpPr>
-        <p:cNvPr id="1" name="Shape 924"/>
-        <p:cNvGrpSpPr/>
-        <p:nvPr/>
-      </p:nvGrpSpPr>
-      <p:grpSpPr>
-        <a:xfrm>
-          <a:off x="0" y="0"/>
-          <a:ext cx="0" cy="0"/>
-          <a:chOff x="0" y="0"/>
-          <a:chExt cx="0" cy="0"/>
-        </a:xfrm>
-      </p:grpSpPr>
-      <p:sp>
-        <p:nvSpPr>
-          <p:cNvPr id="11" name="Google Shape;926;p32">
-            <a:extLst>
-              <a:ext uri="{FF2B5EF4-FFF2-40B4-BE49-F238E27FC236}">
-                <a16:creationId xmlns:a16="http://schemas.microsoft.com/office/drawing/2014/main" id="{647BC891-3EFB-43CC-85D4-222F6095862A}"/>
-              </a:ext>
-            </a:extLst>
-          </p:cNvPr>
-          <p:cNvSpPr txBox="1">
-            <a:spLocks noGrp="1"/>
-          </p:cNvSpPr>
-          <p:nvPr>
-            <p:ph type="subTitle" idx="1"/>
-          </p:nvPr>
-        </p:nvSpPr>
-        <p:spPr>
-          <a:xfrm>
-            <a:off x="348456" y="1162050"/>
-            <a:ext cx="8447088" cy="1572408"/>
-          </a:xfrm>
-          <a:prstGeom prst="rect">
-            <a:avLst/>
-          </a:prstGeom>
-        </p:spPr>
-        <p:txBody>
-          <a:bodyPr spcFirstLastPara="1" wrap="square" lIns="91425" tIns="91425" rIns="91425" bIns="91425" anchor="t" anchorCtr="0">
-            <a:noAutofit/>
-          </a:bodyPr>
-          <a:lstStyle/>
-          <a:p>
-            <a:pPr marL="0" lvl="0" indent="0" algn="just" rtl="0">
-              <a:lnSpc>
-                <a:spcPct val="150000"/>
-              </a:lnSpc>
-              <a:spcBef>
-                <a:spcPts val="0"/>
-              </a:spcBef>
-              <a:spcAft>
-                <a:spcPts val="0"/>
-              </a:spcAft>
-            </a:pPr>
-            <a:r>
-              <a:rPr lang="en-US" sz="2000" dirty="0"/>
-              <a:t>Graf </a:t>
-            </a:r>
-            <a:r>
-              <a:rPr lang="en-US" sz="2000" dirty="0" err="1"/>
-              <a:t>dapat</a:t>
-            </a:r>
-            <a:r>
-              <a:rPr lang="en-US" sz="2000" dirty="0"/>
-              <a:t> </a:t>
-            </a:r>
-            <a:r>
-              <a:rPr lang="en-US" sz="2000" dirty="0" err="1"/>
-              <a:t>tidak</a:t>
-            </a:r>
-            <a:r>
-              <a:rPr lang="en-US" sz="2000" dirty="0"/>
-              <a:t> </a:t>
-            </a:r>
-            <a:r>
-              <a:rPr lang="en-US" sz="2000" dirty="0" err="1"/>
-              <a:t>mengandung</a:t>
-            </a:r>
-            <a:r>
-              <a:rPr lang="en-US" sz="2000" dirty="0"/>
-              <a:t>:</a:t>
-            </a:r>
-          </a:p>
-          <a:p>
-            <a:pPr marL="342900" lvl="0" indent="-342900" algn="just" rtl="0">
-              <a:lnSpc>
-                <a:spcPct val="150000"/>
-              </a:lnSpc>
-              <a:spcBef>
-                <a:spcPts val="0"/>
-              </a:spcBef>
-              <a:spcAft>
-                <a:spcPts val="0"/>
-              </a:spcAft>
-              <a:buFont typeface="Wingdings" panose="05000000000000000000" pitchFamily="2" charset="2"/>
-              <a:buChar char="q"/>
-            </a:pPr>
-            <a:r>
-              <a:rPr lang="en-US" sz="2000" dirty="0" err="1"/>
-              <a:t>Lintasan</a:t>
-            </a:r>
-            <a:r>
-              <a:rPr lang="en-US" sz="2000" dirty="0"/>
-              <a:t> Euler </a:t>
-            </a:r>
-            <a:r>
-              <a:rPr lang="en-US" sz="2000" dirty="0" err="1"/>
-              <a:t>namun</a:t>
-            </a:r>
-            <a:r>
-              <a:rPr lang="en-US" sz="2000" dirty="0"/>
-              <a:t> </a:t>
-            </a:r>
-            <a:r>
-              <a:rPr lang="en-US" sz="2000" dirty="0" err="1"/>
-              <a:t>mengandung</a:t>
-            </a:r>
-            <a:r>
-              <a:rPr lang="en-US" sz="2000" dirty="0"/>
-              <a:t> </a:t>
-            </a:r>
-            <a:r>
-              <a:rPr lang="en-US" sz="2000" dirty="0" err="1"/>
-              <a:t>sirkuit</a:t>
-            </a:r>
-            <a:r>
-              <a:rPr lang="en-US" sz="2000" dirty="0"/>
-              <a:t> Hamilton.</a:t>
-            </a:r>
-          </a:p>
-          <a:p>
-            <a:pPr marL="342900" lvl="0" indent="-342900" algn="just" rtl="0">
-              <a:lnSpc>
-                <a:spcPct val="150000"/>
-              </a:lnSpc>
-              <a:spcBef>
-                <a:spcPts val="0"/>
-              </a:spcBef>
-              <a:spcAft>
-                <a:spcPts val="0"/>
-              </a:spcAft>
-              <a:buFont typeface="Wingdings" panose="05000000000000000000" pitchFamily="2" charset="2"/>
-              <a:buChar char="q"/>
-            </a:pPr>
-            <a:r>
-              <a:rPr lang="en-US" sz="2000" dirty="0"/>
-              <a:t>Dan lain </a:t>
-            </a:r>
-            <a:r>
-              <a:rPr lang="en-US" sz="2000" dirty="0" err="1"/>
-              <a:t>sebagainya</a:t>
-            </a:r>
-            <a:r>
-              <a:rPr lang="en-US" sz="2000" dirty="0"/>
-              <a:t>.</a:t>
-            </a:r>
-          </a:p>
-        </p:txBody>
-      </p:sp>
-      <p:pic>
-        <p:nvPicPr>
-          <p:cNvPr id="7" name="Picture 6">
-            <a:extLst>
-              <a:ext uri="{FF2B5EF4-FFF2-40B4-BE49-F238E27FC236}">
-                <a16:creationId xmlns:a16="http://schemas.microsoft.com/office/drawing/2014/main" id="{0BDEEEB3-82BD-4D2F-A9C4-27E0F93B3691}"/>
-              </a:ext>
-            </a:extLst>
-          </p:cNvPr>
-          <p:cNvPicPr>
-            <a:picLocks noChangeAspect="1"/>
-          </p:cNvPicPr>
-          <p:nvPr/>
-        </p:nvPicPr>
-        <p:blipFill>
-          <a:blip r:embed="rId3"/>
-          <a:stretch>
-            <a:fillRect/>
-          </a:stretch>
-        </p:blipFill>
-        <p:spPr>
-          <a:xfrm>
-            <a:off x="427962" y="2809762"/>
-            <a:ext cx="2171177" cy="1880573"/>
-          </a:xfrm>
-          <a:prstGeom prst="rect">
-            <a:avLst/>
-          </a:prstGeom>
-        </p:spPr>
-      </p:pic>
-      <p:sp>
-        <p:nvSpPr>
-          <p:cNvPr id="12" name="Google Shape;926;p32">
-            <a:extLst>
-              <a:ext uri="{FF2B5EF4-FFF2-40B4-BE49-F238E27FC236}">
-                <a16:creationId xmlns:a16="http://schemas.microsoft.com/office/drawing/2014/main" id="{E53B5AC5-ABD1-4CD5-B057-4A093C523306}"/>
-              </a:ext>
-            </a:extLst>
-          </p:cNvPr>
-          <p:cNvSpPr txBox="1">
-            <a:spLocks/>
-          </p:cNvSpPr>
-          <p:nvPr/>
-        </p:nvSpPr>
-        <p:spPr>
-          <a:xfrm>
-            <a:off x="2599139" y="3076687"/>
-            <a:ext cx="6196405" cy="904763"/>
-          </a:xfrm>
-          <a:prstGeom prst="rect">
-            <a:avLst/>
-          </a:prstGeom>
-          <a:noFill/>
-          <a:ln>
-            <a:noFill/>
-          </a:ln>
-        </p:spPr>
-        <p:txBody>
-          <a:bodyPr spcFirstLastPara="1" wrap="square" lIns="91425" tIns="91425" rIns="91425" bIns="91425" anchor="t" anchorCtr="0">
-            <a:noAutofit/>
-          </a:bodyPr>
-          <a:lstStyle>
-            <a:defPPr marR="0" lvl="0" algn="l" rtl="0">
-              <a:lnSpc>
-                <a:spcPct val="100000"/>
-              </a:lnSpc>
-              <a:spcBef>
-                <a:spcPts val="0"/>
-              </a:spcBef>
-              <a:spcAft>
-                <a:spcPts val="0"/>
-              </a:spcAft>
-            </a:defPPr>
-            <a:lvl1pPr marL="457200" marR="0" lvl="0" indent="-317500" algn="l" rtl="0">
-              <a:lnSpc>
-                <a:spcPct val="100000"/>
-              </a:lnSpc>
-              <a:spcBef>
-                <a:spcPts val="0"/>
-              </a:spcBef>
-              <a:spcAft>
-                <a:spcPts val="0"/>
-              </a:spcAft>
-              <a:buClr>
-                <a:schemeClr val="dk2"/>
-              </a:buClr>
-              <a:buSzPts val="1400"/>
-              <a:buFont typeface="Arvo"/>
-              <a:buNone/>
-              <a:defRPr sz="1400" b="0" i="0" u="none" strike="noStrike" cap="none">
-                <a:solidFill>
-                  <a:schemeClr val="dk2"/>
-                </a:solidFill>
-                <a:latin typeface="Arvo"/>
-                <a:ea typeface="Arvo"/>
-                <a:cs typeface="Arvo"/>
-                <a:sym typeface="Arvo"/>
-              </a:defRPr>
-            </a:lvl1pPr>
-            <a:lvl2pPr marL="914400" marR="0" lvl="1" indent="-317500" algn="l" rtl="0">
-              <a:lnSpc>
-                <a:spcPct val="100000"/>
-              </a:lnSpc>
-              <a:spcBef>
-                <a:spcPts val="1600"/>
-              </a:spcBef>
-              <a:spcAft>
-                <a:spcPts val="0"/>
-              </a:spcAft>
-              <a:buClr>
-                <a:schemeClr val="dk2"/>
-              </a:buClr>
-              <a:buSzPts val="1400"/>
-              <a:buFont typeface="Arvo"/>
-              <a:buNone/>
-              <a:defRPr sz="1400" b="0" i="0" u="none" strike="noStrike" cap="none">
-                <a:solidFill>
-                  <a:schemeClr val="dk2"/>
-                </a:solidFill>
-                <a:latin typeface="Arvo"/>
-                <a:ea typeface="Arvo"/>
-                <a:cs typeface="Arvo"/>
-                <a:sym typeface="Arvo"/>
-              </a:defRPr>
-            </a:lvl2pPr>
-            <a:lvl3pPr marL="1371600" marR="0" lvl="2" indent="-317500" algn="l" rtl="0">
-              <a:lnSpc>
-                <a:spcPct val="100000"/>
-              </a:lnSpc>
-              <a:spcBef>
-                <a:spcPts val="1600"/>
-              </a:spcBef>
-              <a:spcAft>
-                <a:spcPts val="0"/>
-              </a:spcAft>
-              <a:buClr>
-                <a:schemeClr val="dk2"/>
-              </a:buClr>
-              <a:buSzPts val="1400"/>
-              <a:buFont typeface="Arvo"/>
-              <a:buNone/>
-              <a:defRPr sz="1400" b="0" i="0" u="none" strike="noStrike" cap="none">
-                <a:solidFill>
-                  <a:schemeClr val="dk2"/>
-                </a:solidFill>
-                <a:latin typeface="Arvo"/>
-                <a:ea typeface="Arvo"/>
-                <a:cs typeface="Arvo"/>
-                <a:sym typeface="Arvo"/>
-              </a:defRPr>
-            </a:lvl3pPr>
-            <a:lvl4pPr marL="1828800" marR="0" lvl="3" indent="-317500" algn="l" rtl="0">
-              <a:lnSpc>
-                <a:spcPct val="100000"/>
-              </a:lnSpc>
-              <a:spcBef>
-                <a:spcPts val="1600"/>
-              </a:spcBef>
-              <a:spcAft>
-                <a:spcPts val="0"/>
-              </a:spcAft>
-              <a:buClr>
-                <a:schemeClr val="dk2"/>
-              </a:buClr>
-              <a:buSzPts val="1400"/>
-              <a:buFont typeface="Arvo"/>
-              <a:buNone/>
-              <a:defRPr sz="1400" b="0" i="0" u="none" strike="noStrike" cap="none">
-                <a:solidFill>
-                  <a:schemeClr val="dk2"/>
-                </a:solidFill>
-                <a:latin typeface="Arvo"/>
-                <a:ea typeface="Arvo"/>
-                <a:cs typeface="Arvo"/>
-                <a:sym typeface="Arvo"/>
-              </a:defRPr>
-            </a:lvl4pPr>
-            <a:lvl5pPr marL="2286000" marR="0" lvl="4" indent="-317500" algn="l" rtl="0">
-              <a:lnSpc>
-                <a:spcPct val="100000"/>
-              </a:lnSpc>
-              <a:spcBef>
-                <a:spcPts val="1600"/>
-              </a:spcBef>
-              <a:spcAft>
-                <a:spcPts val="0"/>
-              </a:spcAft>
-              <a:buClr>
-                <a:schemeClr val="dk2"/>
-              </a:buClr>
-              <a:buSzPts val="1400"/>
-              <a:buFont typeface="Arvo"/>
-              <a:buNone/>
-              <a:defRPr sz="1400" b="0" i="0" u="none" strike="noStrike" cap="none">
-                <a:solidFill>
-                  <a:schemeClr val="dk2"/>
-                </a:solidFill>
-                <a:latin typeface="Arvo"/>
-                <a:ea typeface="Arvo"/>
-                <a:cs typeface="Arvo"/>
-                <a:sym typeface="Arvo"/>
-              </a:defRPr>
-            </a:lvl5pPr>
-            <a:lvl6pPr marL="2743200" marR="0" lvl="5" indent="-317500" algn="l" rtl="0">
-              <a:lnSpc>
-                <a:spcPct val="100000"/>
-              </a:lnSpc>
-              <a:spcBef>
-                <a:spcPts val="1600"/>
-              </a:spcBef>
-              <a:spcAft>
-                <a:spcPts val="0"/>
-              </a:spcAft>
-              <a:buClr>
-                <a:schemeClr val="dk2"/>
-              </a:buClr>
-              <a:buSzPts val="1400"/>
-              <a:buFont typeface="Arvo"/>
-              <a:buNone/>
-              <a:defRPr sz="1400" b="0" i="0" u="none" strike="noStrike" cap="none">
-                <a:solidFill>
-                  <a:schemeClr val="dk2"/>
-                </a:solidFill>
-                <a:latin typeface="Arvo"/>
-                <a:ea typeface="Arvo"/>
-                <a:cs typeface="Arvo"/>
-                <a:sym typeface="Arvo"/>
-              </a:defRPr>
-            </a:lvl6pPr>
-            <a:lvl7pPr marL="3200400" marR="0" lvl="6" indent="-317500" algn="l" rtl="0">
-              <a:lnSpc>
-                <a:spcPct val="100000"/>
-              </a:lnSpc>
-              <a:spcBef>
-                <a:spcPts val="1600"/>
-              </a:spcBef>
-              <a:spcAft>
-                <a:spcPts val="0"/>
-              </a:spcAft>
-              <a:buClr>
-                <a:schemeClr val="dk2"/>
-              </a:buClr>
-              <a:buSzPts val="1400"/>
-              <a:buFont typeface="Arvo"/>
-              <a:buNone/>
-              <a:defRPr sz="1400" b="0" i="0" u="none" strike="noStrike" cap="none">
-                <a:solidFill>
-                  <a:schemeClr val="dk2"/>
-                </a:solidFill>
-                <a:latin typeface="Arvo"/>
-                <a:ea typeface="Arvo"/>
-                <a:cs typeface="Arvo"/>
-                <a:sym typeface="Arvo"/>
-              </a:defRPr>
-            </a:lvl7pPr>
-            <a:lvl8pPr marL="3657600" marR="0" lvl="7" indent="-317500" algn="l" rtl="0">
-              <a:lnSpc>
-                <a:spcPct val="100000"/>
-              </a:lnSpc>
-              <a:spcBef>
-                <a:spcPts val="1600"/>
-              </a:spcBef>
-              <a:spcAft>
-                <a:spcPts val="0"/>
-              </a:spcAft>
-              <a:buClr>
-                <a:schemeClr val="dk2"/>
-              </a:buClr>
-              <a:buSzPts val="1400"/>
-              <a:buFont typeface="Arvo"/>
-              <a:buNone/>
-              <a:defRPr sz="1400" b="0" i="0" u="none" strike="noStrike" cap="none">
-                <a:solidFill>
-                  <a:schemeClr val="dk2"/>
-                </a:solidFill>
-                <a:latin typeface="Arvo"/>
-                <a:ea typeface="Arvo"/>
-                <a:cs typeface="Arvo"/>
-                <a:sym typeface="Arvo"/>
-              </a:defRPr>
-            </a:lvl8pPr>
-            <a:lvl9pPr marL="4114800" marR="0" lvl="8" indent="-317500" algn="l" rtl="0">
-              <a:lnSpc>
-                <a:spcPct val="100000"/>
-              </a:lnSpc>
-              <a:spcBef>
-                <a:spcPts val="1600"/>
-              </a:spcBef>
-              <a:spcAft>
-                <a:spcPts val="1600"/>
-              </a:spcAft>
-              <a:buClr>
-                <a:schemeClr val="dk2"/>
-              </a:buClr>
-              <a:buSzPts val="1400"/>
-              <a:buFont typeface="Arvo"/>
-              <a:buNone/>
-              <a:defRPr sz="1400" b="0" i="0" u="none" strike="noStrike" cap="none">
-                <a:solidFill>
-                  <a:schemeClr val="dk2"/>
-                </a:solidFill>
-                <a:latin typeface="Arvo"/>
-                <a:ea typeface="Arvo"/>
-                <a:cs typeface="Arvo"/>
-                <a:sym typeface="Arvo"/>
-              </a:defRPr>
-            </a:lvl9pPr>
-          </a:lstStyle>
-          <a:p>
-            <a:pPr marL="0" indent="0" algn="just">
-              <a:lnSpc>
-                <a:spcPct val="150000"/>
-              </a:lnSpc>
-            </a:pPr>
-            <a:r>
-              <a:rPr lang="da-DK" sz="2000" dirty="0"/>
-              <a:t>(a) Graf Hamilton sekaligus graf Euler.</a:t>
-            </a:r>
-          </a:p>
-          <a:p>
-            <a:pPr marL="0" indent="0" algn="just">
-              <a:lnSpc>
-                <a:spcPct val="150000"/>
-              </a:lnSpc>
-            </a:pPr>
-            <a:r>
-              <a:rPr lang="da-DK" sz="2000" dirty="0"/>
-              <a:t>(b) Graf Hamilton sekaligus graf semi-Euler.</a:t>
-            </a:r>
-            <a:endParaRPr lang="en-US" sz="2000" dirty="0"/>
-          </a:p>
-        </p:txBody>
-      </p:sp>
-    </p:spTree>
-    <p:extLst>
-      <p:ext uri="{BB962C8B-B14F-4D97-AF65-F5344CB8AC3E}">
-        <p14:creationId xmlns:p14="http://schemas.microsoft.com/office/powerpoint/2010/main" val="405687146"/>
       </p:ext>
     </p:extLst>
   </p:cSld>

</xml_diff>